<commit_message>
* rearrangement of packages
</commit_message>
<xml_diff>
--- a/RailViewApp/Overview of UI.pptx
+++ b/RailViewApp/Overview of UI.pptx
@@ -6,6 +6,7 @@
   </p:sldMasterIdLst>
   <p:sldIdLst>
     <p:sldId id="256" r:id="rId2"/>
+    <p:sldId id="257" r:id="rId3"/>
   </p:sldIdLst>
   <p:sldSz cx="12192000" cy="6858000"/>
   <p:notesSz cx="6858000" cy="9144000"/>
@@ -243,7 +244,7 @@
           <a:p>
             <a:fld id="{1D1294A9-0B4A-4961-A951-34E9345B148A}" type="datetimeFigureOut">
               <a:rPr lang="de-DE" smtClean="0"/>
-              <a:t>23.10.2019</a:t>
+              <a:t>26.10.2019</a:t>
             </a:fld>
             <a:endParaRPr lang="de-DE"/>
           </a:p>
@@ -413,7 +414,7 @@
           <a:p>
             <a:fld id="{1D1294A9-0B4A-4961-A951-34E9345B148A}" type="datetimeFigureOut">
               <a:rPr lang="de-DE" smtClean="0"/>
-              <a:t>23.10.2019</a:t>
+              <a:t>26.10.2019</a:t>
             </a:fld>
             <a:endParaRPr lang="de-DE"/>
           </a:p>
@@ -593,7 +594,7 @@
           <a:p>
             <a:fld id="{1D1294A9-0B4A-4961-A951-34E9345B148A}" type="datetimeFigureOut">
               <a:rPr lang="de-DE" smtClean="0"/>
-              <a:t>23.10.2019</a:t>
+              <a:t>26.10.2019</a:t>
             </a:fld>
             <a:endParaRPr lang="de-DE"/>
           </a:p>
@@ -763,7 +764,7 @@
           <a:p>
             <a:fld id="{1D1294A9-0B4A-4961-A951-34E9345B148A}" type="datetimeFigureOut">
               <a:rPr lang="de-DE" smtClean="0"/>
-              <a:t>23.10.2019</a:t>
+              <a:t>26.10.2019</a:t>
             </a:fld>
             <a:endParaRPr lang="de-DE"/>
           </a:p>
@@ -1009,7 +1010,7 @@
           <a:p>
             <a:fld id="{1D1294A9-0B4A-4961-A951-34E9345B148A}" type="datetimeFigureOut">
               <a:rPr lang="de-DE" smtClean="0"/>
-              <a:t>23.10.2019</a:t>
+              <a:t>26.10.2019</a:t>
             </a:fld>
             <a:endParaRPr lang="de-DE"/>
           </a:p>
@@ -1241,7 +1242,7 @@
           <a:p>
             <a:fld id="{1D1294A9-0B4A-4961-A951-34E9345B148A}" type="datetimeFigureOut">
               <a:rPr lang="de-DE" smtClean="0"/>
-              <a:t>23.10.2019</a:t>
+              <a:t>26.10.2019</a:t>
             </a:fld>
             <a:endParaRPr lang="de-DE"/>
           </a:p>
@@ -1608,7 +1609,7 @@
           <a:p>
             <a:fld id="{1D1294A9-0B4A-4961-A951-34E9345B148A}" type="datetimeFigureOut">
               <a:rPr lang="de-DE" smtClean="0"/>
-              <a:t>23.10.2019</a:t>
+              <a:t>26.10.2019</a:t>
             </a:fld>
             <a:endParaRPr lang="de-DE"/>
           </a:p>
@@ -1726,7 +1727,7 @@
           <a:p>
             <a:fld id="{1D1294A9-0B4A-4961-A951-34E9345B148A}" type="datetimeFigureOut">
               <a:rPr lang="de-DE" smtClean="0"/>
-              <a:t>23.10.2019</a:t>
+              <a:t>26.10.2019</a:t>
             </a:fld>
             <a:endParaRPr lang="de-DE"/>
           </a:p>
@@ -1821,7 +1822,7 @@
           <a:p>
             <a:fld id="{1D1294A9-0B4A-4961-A951-34E9345B148A}" type="datetimeFigureOut">
               <a:rPr lang="de-DE" smtClean="0"/>
-              <a:t>23.10.2019</a:t>
+              <a:t>26.10.2019</a:t>
             </a:fld>
             <a:endParaRPr lang="de-DE"/>
           </a:p>
@@ -2098,7 +2099,7 @@
           <a:p>
             <a:fld id="{1D1294A9-0B4A-4961-A951-34E9345B148A}" type="datetimeFigureOut">
               <a:rPr lang="de-DE" smtClean="0"/>
-              <a:t>23.10.2019</a:t>
+              <a:t>26.10.2019</a:t>
             </a:fld>
             <a:endParaRPr lang="de-DE"/>
           </a:p>
@@ -2351,7 +2352,7 @@
           <a:p>
             <a:fld id="{1D1294A9-0B4A-4961-A951-34E9345B148A}" type="datetimeFigureOut">
               <a:rPr lang="de-DE" smtClean="0"/>
-              <a:t>23.10.2019</a:t>
+              <a:t>26.10.2019</a:t>
             </a:fld>
             <a:endParaRPr lang="de-DE"/>
           </a:p>
@@ -2564,7 +2565,7 @@
           <a:p>
             <a:fld id="{1D1294A9-0B4A-4961-A951-34E9345B148A}" type="datetimeFigureOut">
               <a:rPr lang="de-DE" smtClean="0"/>
-              <a:t>23.10.2019</a:t>
+              <a:t>26.10.2019</a:t>
             </a:fld>
             <a:endParaRPr lang="de-DE"/>
           </a:p>
@@ -3035,8 +3036,8 @@
         </p:nvSpPr>
         <p:spPr>
           <a:xfrm>
-            <a:off x="446504" y="4036970"/>
-            <a:ext cx="1029004" cy="1211226"/>
+            <a:off x="240761" y="4036970"/>
+            <a:ext cx="1612697" cy="773857"/>
           </a:xfrm>
           <a:prstGeom prst="rect">
             <a:avLst/>
@@ -3111,8 +3112,8 @@
         </p:nvSpPr>
         <p:spPr>
           <a:xfrm>
-            <a:off x="240761" y="6112388"/>
-            <a:ext cx="2371810" cy="725410"/>
+            <a:off x="70108" y="6112388"/>
+            <a:ext cx="2657724" cy="725410"/>
           </a:xfrm>
           <a:prstGeom prst="rect">
             <a:avLst/>
@@ -3187,7 +3188,7 @@
         </p:nvSpPr>
         <p:spPr>
           <a:xfrm>
-            <a:off x="2848924" y="6062537"/>
+            <a:off x="2972375" y="6112388"/>
             <a:ext cx="2093661" cy="725410"/>
           </a:xfrm>
           <a:prstGeom prst="rect">
@@ -3233,7 +3234,7 @@
         </p:nvSpPr>
         <p:spPr>
           <a:xfrm>
-            <a:off x="2821092" y="6333383"/>
+            <a:off x="2916984" y="6306677"/>
             <a:ext cx="1104854" cy="369332"/>
           </a:xfrm>
           <a:prstGeom prst="rect">
@@ -3303,8 +3304,8 @@
         </p:nvCxnSpPr>
         <p:spPr>
           <a:xfrm>
-            <a:off x="961006" y="5248196"/>
-            <a:ext cx="465660" cy="864192"/>
+            <a:off x="1047110" y="4810827"/>
+            <a:ext cx="351860" cy="1301561"/>
           </a:xfrm>
           <a:prstGeom prst="line">
             <a:avLst/>
@@ -3341,8 +3342,8 @@
         </p:nvCxnSpPr>
         <p:spPr>
           <a:xfrm>
-            <a:off x="961006" y="5248196"/>
-            <a:ext cx="2934749" cy="814341"/>
+            <a:off x="1047110" y="4810827"/>
+            <a:ext cx="2972096" cy="1301561"/>
           </a:xfrm>
           <a:prstGeom prst="line">
             <a:avLst/>
@@ -3384,7 +3385,7 @@
         </p:blipFill>
         <p:spPr>
           <a:xfrm>
-            <a:off x="3750143" y="4318694"/>
+            <a:off x="3823633" y="4847415"/>
             <a:ext cx="4856149" cy="406754"/>
           </a:xfrm>
           <a:prstGeom prst="rect">
@@ -3400,7 +3401,7 @@
         </p:nvSpPr>
         <p:spPr>
           <a:xfrm>
-            <a:off x="3646822" y="3949362"/>
+            <a:off x="3720312" y="4478083"/>
             <a:ext cx="1184876" cy="369332"/>
           </a:xfrm>
           <a:prstGeom prst="rect">
@@ -3488,7 +3489,7 @@
         <p:spPr>
           <a:xfrm>
             <a:off x="5245677" y="1819977"/>
-            <a:ext cx="932541" cy="2498717"/>
+            <a:ext cx="1006031" cy="3027438"/>
           </a:xfrm>
           <a:prstGeom prst="line">
             <a:avLst/>
@@ -3563,8 +3564,8 @@
         </p:nvCxnSpPr>
         <p:spPr>
           <a:xfrm flipH="1">
-            <a:off x="961006" y="1819977"/>
-            <a:ext cx="4284671" cy="2216993"/>
+            <a:off x="1047110" y="1819977"/>
+            <a:ext cx="4198567" cy="2216993"/>
           </a:xfrm>
           <a:prstGeom prst="line">
             <a:avLst/>
@@ -3865,7 +3866,7 @@
         </p:nvSpPr>
         <p:spPr>
           <a:xfrm>
-            <a:off x="7197821" y="2947730"/>
+            <a:off x="7920061" y="2778743"/>
             <a:ext cx="4271939" cy="369332"/>
           </a:xfrm>
           <a:prstGeom prst="rect">
@@ -3914,6 +3915,155 @@
             <a:avLst/>
           </a:prstGeom>
           <a:ln w="38100">
+            <a:solidFill>
+              <a:schemeClr val="tx1"/>
+            </a:solidFill>
+          </a:ln>
+        </p:spPr>
+        <p:style>
+          <a:lnRef idx="1">
+            <a:schemeClr val="accent1"/>
+          </a:lnRef>
+          <a:fillRef idx="0">
+            <a:schemeClr val="accent1"/>
+          </a:fillRef>
+          <a:effectRef idx="0">
+            <a:schemeClr val="accent1"/>
+          </a:effectRef>
+          <a:fontRef idx="minor">
+            <a:schemeClr val="tx1"/>
+          </a:fontRef>
+        </p:style>
+      </p:cxnSp>
+      <p:sp>
+        <p:nvSpPr>
+          <p:cNvPr id="30" name="Rechteck 29"/>
+          <p:cNvSpPr/>
+          <p:nvPr/>
+        </p:nvSpPr>
+        <p:spPr>
+          <a:xfrm>
+            <a:off x="191031" y="4036970"/>
+            <a:ext cx="3079689" cy="369332"/>
+          </a:xfrm>
+          <a:prstGeom prst="rect">
+            <a:avLst/>
+          </a:prstGeom>
+        </p:spPr>
+        <p:txBody>
+          <a:bodyPr wrap="none">
+            <a:spAutoFit/>
+          </a:bodyPr>
+          <a:lstStyle/>
+          <a:p>
+            <a:r>
+              <a:rPr lang="de-DE" dirty="0" err="1">
+                <a:solidFill>
+                  <a:srgbClr val="000000"/>
+                </a:solidFill>
+                <a:highlight>
+                  <a:srgbClr val="D4D4D4"/>
+                </a:highlight>
+                <a:latin typeface="Courier New" panose="02070309020205020404" pitchFamily="49" charset="0"/>
+              </a:rPr>
+              <a:t>NetworkPaneController</a:t>
+            </a:r>
+            <a:endParaRPr lang="de-DE" dirty="0"/>
+          </a:p>
+        </p:txBody>
+      </p:sp>
+      <p:sp>
+        <p:nvSpPr>
+          <p:cNvPr id="31" name="Rechteck 30"/>
+          <p:cNvSpPr/>
+          <p:nvPr/>
+        </p:nvSpPr>
+        <p:spPr>
+          <a:xfrm>
+            <a:off x="3737539" y="5240661"/>
+            <a:ext cx="2803973" cy="369332"/>
+          </a:xfrm>
+          <a:prstGeom prst="rect">
+            <a:avLst/>
+          </a:prstGeom>
+        </p:spPr>
+        <p:txBody>
+          <a:bodyPr wrap="none">
+            <a:spAutoFit/>
+          </a:bodyPr>
+          <a:lstStyle/>
+          <a:p>
+            <a:r>
+              <a:rPr lang="de-DE" dirty="0" err="1">
+                <a:solidFill>
+                  <a:srgbClr val="000000"/>
+                </a:solidFill>
+                <a:highlight>
+                  <a:srgbClr val="D4D4D4"/>
+                </a:highlight>
+                <a:latin typeface="Courier New" panose="02070309020205020404" pitchFamily="49" charset="0"/>
+              </a:rPr>
+              <a:t>GraphPaneController</a:t>
+            </a:r>
+            <a:endParaRPr lang="de-DE" dirty="0"/>
+          </a:p>
+        </p:txBody>
+      </p:sp>
+      <p:sp>
+        <p:nvSpPr>
+          <p:cNvPr id="33" name="Rechteck 32"/>
+          <p:cNvSpPr/>
+          <p:nvPr/>
+        </p:nvSpPr>
+        <p:spPr>
+          <a:xfrm>
+            <a:off x="2634673" y="3301488"/>
+            <a:ext cx="3906839" cy="369332"/>
+          </a:xfrm>
+          <a:prstGeom prst="rect">
+            <a:avLst/>
+          </a:prstGeom>
+        </p:spPr>
+        <p:txBody>
+          <a:bodyPr wrap="none">
+            <a:spAutoFit/>
+          </a:bodyPr>
+          <a:lstStyle/>
+          <a:p>
+            <a:r>
+              <a:rPr lang="de-DE" dirty="0" err="1">
+                <a:solidFill>
+                  <a:srgbClr val="000000"/>
+                </a:solidFill>
+                <a:highlight>
+                  <a:srgbClr val="D4D4D4"/>
+                </a:highlight>
+                <a:latin typeface="Courier New" panose="02070309020205020404" pitchFamily="49" charset="0"/>
+              </a:rPr>
+              <a:t>ConfigurationPaneController</a:t>
+            </a:r>
+            <a:endParaRPr lang="de-DE" dirty="0"/>
+          </a:p>
+        </p:txBody>
+      </p:sp>
+      <p:cxnSp>
+        <p:nvCxnSpPr>
+          <p:cNvPr id="44" name="Gerader Verbinder 43"/>
+          <p:cNvCxnSpPr>
+            <a:stCxn id="88" idx="2"/>
+            <a:endCxn id="33" idx="0"/>
+          </p:cNvCxnSpPr>
+          <p:nvPr/>
+        </p:nvCxnSpPr>
+        <p:spPr>
+          <a:xfrm flipH="1">
+            <a:off x="4588093" y="1819977"/>
+            <a:ext cx="657584" cy="1481511"/>
+          </a:xfrm>
+          <a:prstGeom prst="line">
+            <a:avLst/>
+          </a:prstGeom>
+          <a:ln>
             <a:solidFill>
               <a:schemeClr val="tx1"/>
             </a:solidFill>
@@ -3938,6 +4088,36 @@
     <p:extLst>
       <p:ext uri="{BB962C8B-B14F-4D97-AF65-F5344CB8AC3E}">
         <p14:creationId xmlns:p14="http://schemas.microsoft.com/office/powerpoint/2010/main" val="4072563050"/>
+      </p:ext>
+    </p:extLst>
+  </p:cSld>
+  <p:clrMapOvr>
+    <a:masterClrMapping/>
+  </p:clrMapOvr>
+</p:sld>
+</file>
+
+<file path=ppt/slides/slide2.xml><?xml version="1.0" encoding="utf-8"?>
+<p:sld xmlns:a="http://schemas.openxmlformats.org/drawingml/2006/main" xmlns:r="http://schemas.openxmlformats.org/officeDocument/2006/relationships" xmlns:p="http://schemas.openxmlformats.org/presentationml/2006/main">
+  <p:cSld>
+    <p:spTree>
+      <p:nvGrpSpPr>
+        <p:cNvPr id="1" name=""/>
+        <p:cNvGrpSpPr/>
+        <p:nvPr/>
+      </p:nvGrpSpPr>
+      <p:grpSpPr>
+        <a:xfrm>
+          <a:off x="0" y="0"/>
+          <a:ext cx="0" cy="0"/>
+          <a:chOff x="0" y="0"/>
+          <a:chExt cx="0" cy="0"/>
+        </a:xfrm>
+      </p:grpSpPr>
+    </p:spTree>
+    <p:extLst>
+      <p:ext uri="{BB962C8B-B14F-4D97-AF65-F5344CB8AC3E}">
+        <p14:creationId xmlns:p14="http://schemas.microsoft.com/office/powerpoint/2010/main" val="2761561199"/>
       </p:ext>
     </p:extLst>
   </p:cSld>

</xml_diff>

<commit_message>
* set addtional button to start python gateway server
</commit_message>
<xml_diff>
--- a/RailViewApp/Overview of UI.pptx
+++ b/RailViewApp/Overview of UI.pptx
@@ -244,7 +244,7 @@
           <a:p>
             <a:fld id="{1D1294A9-0B4A-4961-A951-34E9345B148A}" type="datetimeFigureOut">
               <a:rPr lang="de-DE" smtClean="0"/>
-              <a:t>26.10.2019</a:t>
+              <a:t>09.11.2019</a:t>
             </a:fld>
             <a:endParaRPr lang="de-DE"/>
           </a:p>
@@ -414,7 +414,7 @@
           <a:p>
             <a:fld id="{1D1294A9-0B4A-4961-A951-34E9345B148A}" type="datetimeFigureOut">
               <a:rPr lang="de-DE" smtClean="0"/>
-              <a:t>26.10.2019</a:t>
+              <a:t>09.11.2019</a:t>
             </a:fld>
             <a:endParaRPr lang="de-DE"/>
           </a:p>
@@ -594,7 +594,7 @@
           <a:p>
             <a:fld id="{1D1294A9-0B4A-4961-A951-34E9345B148A}" type="datetimeFigureOut">
               <a:rPr lang="de-DE" smtClean="0"/>
-              <a:t>26.10.2019</a:t>
+              <a:t>09.11.2019</a:t>
             </a:fld>
             <a:endParaRPr lang="de-DE"/>
           </a:p>
@@ -764,7 +764,7 @@
           <a:p>
             <a:fld id="{1D1294A9-0B4A-4961-A951-34E9345B148A}" type="datetimeFigureOut">
               <a:rPr lang="de-DE" smtClean="0"/>
-              <a:t>26.10.2019</a:t>
+              <a:t>09.11.2019</a:t>
             </a:fld>
             <a:endParaRPr lang="de-DE"/>
           </a:p>
@@ -1010,7 +1010,7 @@
           <a:p>
             <a:fld id="{1D1294A9-0B4A-4961-A951-34E9345B148A}" type="datetimeFigureOut">
               <a:rPr lang="de-DE" smtClean="0"/>
-              <a:t>26.10.2019</a:t>
+              <a:t>09.11.2019</a:t>
             </a:fld>
             <a:endParaRPr lang="de-DE"/>
           </a:p>
@@ -1242,7 +1242,7 @@
           <a:p>
             <a:fld id="{1D1294A9-0B4A-4961-A951-34E9345B148A}" type="datetimeFigureOut">
               <a:rPr lang="de-DE" smtClean="0"/>
-              <a:t>26.10.2019</a:t>
+              <a:t>09.11.2019</a:t>
             </a:fld>
             <a:endParaRPr lang="de-DE"/>
           </a:p>
@@ -1609,7 +1609,7 @@
           <a:p>
             <a:fld id="{1D1294A9-0B4A-4961-A951-34E9345B148A}" type="datetimeFigureOut">
               <a:rPr lang="de-DE" smtClean="0"/>
-              <a:t>26.10.2019</a:t>
+              <a:t>09.11.2019</a:t>
             </a:fld>
             <a:endParaRPr lang="de-DE"/>
           </a:p>
@@ -1727,7 +1727,7 @@
           <a:p>
             <a:fld id="{1D1294A9-0B4A-4961-A951-34E9345B148A}" type="datetimeFigureOut">
               <a:rPr lang="de-DE" smtClean="0"/>
-              <a:t>26.10.2019</a:t>
+              <a:t>09.11.2019</a:t>
             </a:fld>
             <a:endParaRPr lang="de-DE"/>
           </a:p>
@@ -1822,7 +1822,7 @@
           <a:p>
             <a:fld id="{1D1294A9-0B4A-4961-A951-34E9345B148A}" type="datetimeFigureOut">
               <a:rPr lang="de-DE" smtClean="0"/>
-              <a:t>26.10.2019</a:t>
+              <a:t>09.11.2019</a:t>
             </a:fld>
             <a:endParaRPr lang="de-DE"/>
           </a:p>
@@ -2099,7 +2099,7 @@
           <a:p>
             <a:fld id="{1D1294A9-0B4A-4961-A951-34E9345B148A}" type="datetimeFigureOut">
               <a:rPr lang="de-DE" smtClean="0"/>
-              <a:t>26.10.2019</a:t>
+              <a:t>09.11.2019</a:t>
             </a:fld>
             <a:endParaRPr lang="de-DE"/>
           </a:p>
@@ -2352,7 +2352,7 @@
           <a:p>
             <a:fld id="{1D1294A9-0B4A-4961-A951-34E9345B148A}" type="datetimeFigureOut">
               <a:rPr lang="de-DE" smtClean="0"/>
-              <a:t>26.10.2019</a:t>
+              <a:t>09.11.2019</a:t>
             </a:fld>
             <a:endParaRPr lang="de-DE"/>
           </a:p>
@@ -2565,7 +2565,7 @@
           <a:p>
             <a:fld id="{1D1294A9-0B4A-4961-A951-34E9345B148A}" type="datetimeFigureOut">
               <a:rPr lang="de-DE" smtClean="0"/>
-              <a:t>26.10.2019</a:t>
+              <a:t>09.11.2019</a:t>
             </a:fld>
             <a:endParaRPr lang="de-DE"/>
           </a:p>
@@ -3488,8 +3488,8 @@
         </p:nvCxnSpPr>
         <p:spPr>
           <a:xfrm>
-            <a:off x="5245677" y="1819977"/>
-            <a:ext cx="1006031" cy="3027438"/>
+            <a:off x="5176748" y="1819977"/>
+            <a:ext cx="1074960" cy="3027438"/>
           </a:xfrm>
           <a:prstGeom prst="line">
             <a:avLst/>
@@ -3526,8 +3526,8 @@
         </p:nvCxnSpPr>
         <p:spPr>
           <a:xfrm>
-            <a:off x="5245677" y="1819977"/>
-            <a:ext cx="5153978" cy="2559782"/>
+            <a:off x="5176748" y="1819977"/>
+            <a:ext cx="5222907" cy="2559782"/>
           </a:xfrm>
           <a:prstGeom prst="line">
             <a:avLst/>
@@ -3565,7 +3565,7 @@
         <p:spPr>
           <a:xfrm flipH="1">
             <a:off x="1047110" y="1819977"/>
-            <a:ext cx="4198567" cy="2216993"/>
+            <a:ext cx="4129638" cy="2216993"/>
           </a:xfrm>
           <a:prstGeom prst="line">
             <a:avLst/>
@@ -3600,7 +3600,7 @@
         <p:spPr>
           <a:xfrm>
             <a:off x="4119407" y="927973"/>
-            <a:ext cx="1563248" cy="369332"/>
+            <a:ext cx="1701107" cy="369332"/>
           </a:xfrm>
           <a:prstGeom prst="rect">
             <a:avLst/>
@@ -3613,7 +3613,7 @@
           <a:lstStyle/>
           <a:p>
             <a:r>
-              <a:rPr lang="de-DE" i="1" dirty="0" err="1">
+              <a:rPr lang="de-DE" i="1" dirty="0" err="1" smtClean="0">
                 <a:solidFill>
                   <a:srgbClr val="2A00FF"/>
                 </a:solidFill>
@@ -3622,7 +3622,7 @@
                 </a:highlight>
                 <a:latin typeface="Courier New" panose="02070309020205020404" pitchFamily="49" charset="0"/>
               </a:rPr>
-              <a:t>symbolPane</a:t>
+              <a:t>controlPane</a:t>
             </a:r>
             <a:endParaRPr lang="de-DE" dirty="0"/>
           </a:p>
@@ -3750,7 +3750,7 @@
         <p:spPr>
           <a:xfrm>
             <a:off x="4119407" y="1450645"/>
-            <a:ext cx="2252540" cy="369332"/>
+            <a:ext cx="2114681" cy="369332"/>
           </a:xfrm>
           <a:prstGeom prst="rect">
             <a:avLst/>
@@ -3772,7 +3772,7 @@
                 </a:highlight>
                 <a:latin typeface="Courier New" panose="02070309020205020404" pitchFamily="49" charset="0"/>
               </a:rPr>
-              <a:t>networkPaneRoot</a:t>
+              <a:t>simulationPane</a:t>
             </a:r>
             <a:endParaRPr lang="de-DE" dirty="0"/>
           </a:p>
@@ -4058,7 +4058,7 @@
         <p:spPr>
           <a:xfrm flipH="1">
             <a:off x="4588093" y="1819977"/>
-            <a:ext cx="657584" cy="1481511"/>
+            <a:ext cx="588655" cy="1481511"/>
           </a:xfrm>
           <a:prstGeom prst="line">
             <a:avLst/>

</xml_diff>